<commit_message>
more detail informations for the layout
</commit_message>
<xml_diff>
--- a/layout/Layout.pptx
+++ b/layout/Layout.pptx
@@ -7056,6 +7056,556 @@
           </a:p>
         </p:txBody>
       </p:sp>
+      <p:cxnSp>
+        <p:nvCxnSpPr>
+          <p:cNvPr id="29" name="Gerade Verbindung mit Pfeil 28"/>
+          <p:cNvCxnSpPr>
+            <a:cxnSpLocks/>
+          </p:cNvCxnSpPr>
+          <p:nvPr/>
+        </p:nvCxnSpPr>
+        <p:spPr>
+          <a:xfrm flipH="1" flipV="1">
+            <a:off x="6758610" y="2504661"/>
+            <a:ext cx="649355" cy="4572"/>
+          </a:xfrm>
+          <a:prstGeom prst="straightConnector1">
+            <a:avLst/>
+          </a:prstGeom>
+          <a:ln>
+            <a:tailEnd type="triangle"/>
+          </a:ln>
+        </p:spPr>
+        <p:style>
+          <a:lnRef idx="3">
+            <a:schemeClr val="accent2"/>
+          </a:lnRef>
+          <a:fillRef idx="0">
+            <a:schemeClr val="accent2"/>
+          </a:fillRef>
+          <a:effectRef idx="2">
+            <a:schemeClr val="accent2"/>
+          </a:effectRef>
+          <a:fontRef idx="minor">
+            <a:schemeClr val="tx1"/>
+          </a:fontRef>
+        </p:style>
+      </p:cxnSp>
+      <p:sp>
+        <p:nvSpPr>
+          <p:cNvPr id="32" name="Rechteck 31"/>
+          <p:cNvSpPr/>
+          <p:nvPr/>
+        </p:nvSpPr>
+        <p:spPr>
+          <a:xfrm>
+            <a:off x="7407965" y="2233889"/>
+            <a:ext cx="3454279" cy="523220"/>
+          </a:xfrm>
+          <a:prstGeom prst="rect">
+            <a:avLst/>
+          </a:prstGeom>
+          <a:noFill/>
+        </p:spPr>
+        <p:txBody>
+          <a:bodyPr wrap="none" lIns="91440" tIns="45720" rIns="91440" bIns="45720">
+            <a:spAutoFit/>
+          </a:bodyPr>
+          <a:lstStyle/>
+          <a:p>
+            <a:r>
+              <a:rPr lang="de-DE" sz="1400" b="0" cap="none" spc="0" dirty="0">
+                <a:ln w="0"/>
+                <a:solidFill>
+                  <a:schemeClr val="tx1"/>
+                </a:solidFill>
+                <a:effectLst>
+                  <a:outerShdw blurRad="38100" dist="19050" dir="2700000" algn="tl" rotWithShape="0">
+                    <a:schemeClr val="dk1">
+                      <a:alpha val="40000"/>
+                    </a:schemeClr>
+                  </a:outerShdw>
+                </a:effectLst>
+              </a:rPr>
+              <a:t>Hier muss der User die Softwarebezeichnung</a:t>
+            </a:r>
+          </a:p>
+          <a:p>
+            <a:r>
+              <a:rPr lang="de-DE" sz="1400" dirty="0">
+                <a:ln w="0"/>
+                <a:effectLst>
+                  <a:outerShdw blurRad="38100" dist="19050" dir="2700000" algn="tl" rotWithShape="0">
+                    <a:schemeClr val="dk1">
+                      <a:alpha val="40000"/>
+                    </a:schemeClr>
+                  </a:outerShdw>
+                </a:effectLst>
+              </a:rPr>
+              <a:t>d</a:t>
+            </a:r>
+            <a:r>
+              <a:rPr lang="de-DE" sz="1400" b="0" cap="none" spc="0" dirty="0">
+                <a:ln w="0"/>
+                <a:solidFill>
+                  <a:schemeClr val="tx1"/>
+                </a:solidFill>
+                <a:effectLst>
+                  <a:outerShdw blurRad="38100" dist="19050" dir="2700000" algn="tl" rotWithShape="0">
+                    <a:schemeClr val="dk1">
+                      <a:alpha val="40000"/>
+                    </a:schemeClr>
+                  </a:outerShdw>
+                </a:effectLst>
+              </a:rPr>
+              <a:t>er neuen Software eintragen</a:t>
+            </a:r>
+          </a:p>
+        </p:txBody>
+      </p:sp>
+      <p:sp>
+        <p:nvSpPr>
+          <p:cNvPr id="33" name="Rechteck 32"/>
+          <p:cNvSpPr/>
+          <p:nvPr/>
+        </p:nvSpPr>
+        <p:spPr>
+          <a:xfrm>
+            <a:off x="6838122" y="1622055"/>
+            <a:ext cx="4366516" cy="307777"/>
+          </a:xfrm>
+          <a:prstGeom prst="rect">
+            <a:avLst/>
+          </a:prstGeom>
+          <a:noFill/>
+        </p:spPr>
+        <p:txBody>
+          <a:bodyPr wrap="none" lIns="91440" tIns="45720" rIns="91440" bIns="45720">
+            <a:spAutoFit/>
+          </a:bodyPr>
+          <a:lstStyle/>
+          <a:p>
+            <a:r>
+              <a:rPr lang="de-DE" sz="1400" b="0" cap="none" spc="0" dirty="0">
+                <a:ln w="0"/>
+                <a:solidFill>
+                  <a:schemeClr val="tx1"/>
+                </a:solidFill>
+                <a:effectLst>
+                  <a:outerShdw blurRad="38100" dist="38100" dir="2700000" algn="tl">
+                    <a:srgbClr val="000000">
+                      <a:alpha val="43137"/>
+                    </a:srgbClr>
+                  </a:outerShdw>
+                </a:effectLst>
+              </a:rPr>
+              <a:t>Dies ist nur ein Beispiel an Informationen, weitere folgen.</a:t>
+            </a:r>
+          </a:p>
+        </p:txBody>
+      </p:sp>
+      <p:cxnSp>
+        <p:nvCxnSpPr>
+          <p:cNvPr id="34" name="Gerade Verbindung mit Pfeil 33"/>
+          <p:cNvCxnSpPr>
+            <a:cxnSpLocks/>
+            <a:stCxn id="33" idx="1"/>
+          </p:cNvCxnSpPr>
+          <p:nvPr/>
+        </p:nvCxnSpPr>
+        <p:spPr>
+          <a:xfrm flipH="1">
+            <a:off x="6420204" y="1775944"/>
+            <a:ext cx="417918" cy="457945"/>
+          </a:xfrm>
+          <a:prstGeom prst="straightConnector1">
+            <a:avLst/>
+          </a:prstGeom>
+          <a:ln>
+            <a:tailEnd type="triangle"/>
+          </a:ln>
+        </p:spPr>
+        <p:style>
+          <a:lnRef idx="3">
+            <a:schemeClr val="accent2"/>
+          </a:lnRef>
+          <a:fillRef idx="0">
+            <a:schemeClr val="accent2"/>
+          </a:fillRef>
+          <a:effectRef idx="2">
+            <a:schemeClr val="accent2"/>
+          </a:effectRef>
+          <a:fontRef idx="minor">
+            <a:schemeClr val="tx1"/>
+          </a:fontRef>
+        </p:style>
+      </p:cxnSp>
+      <p:cxnSp>
+        <p:nvCxnSpPr>
+          <p:cNvPr id="35" name="Gerade Verbindung mit Pfeil 34"/>
+          <p:cNvCxnSpPr>
+            <a:cxnSpLocks/>
+          </p:cNvCxnSpPr>
+          <p:nvPr/>
+        </p:nvCxnSpPr>
+        <p:spPr>
+          <a:xfrm flipH="1" flipV="1">
+            <a:off x="6758610" y="3450437"/>
+            <a:ext cx="649355" cy="4572"/>
+          </a:xfrm>
+          <a:prstGeom prst="straightConnector1">
+            <a:avLst/>
+          </a:prstGeom>
+          <a:ln>
+            <a:tailEnd type="triangle"/>
+          </a:ln>
+        </p:spPr>
+        <p:style>
+          <a:lnRef idx="3">
+            <a:schemeClr val="accent2"/>
+          </a:lnRef>
+          <a:fillRef idx="0">
+            <a:schemeClr val="accent2"/>
+          </a:fillRef>
+          <a:effectRef idx="2">
+            <a:schemeClr val="accent2"/>
+          </a:effectRef>
+          <a:fontRef idx="minor">
+            <a:schemeClr val="tx1"/>
+          </a:fontRef>
+        </p:style>
+      </p:cxnSp>
+      <p:sp>
+        <p:nvSpPr>
+          <p:cNvPr id="46" name="Rechteck 45"/>
+          <p:cNvSpPr/>
+          <p:nvPr/>
+        </p:nvSpPr>
+        <p:spPr>
+          <a:xfrm>
+            <a:off x="7407965" y="3179665"/>
+            <a:ext cx="3064813" cy="523220"/>
+          </a:xfrm>
+          <a:prstGeom prst="rect">
+            <a:avLst/>
+          </a:prstGeom>
+          <a:noFill/>
+        </p:spPr>
+        <p:txBody>
+          <a:bodyPr wrap="none" lIns="91440" tIns="45720" rIns="91440" bIns="45720">
+            <a:spAutoFit/>
+          </a:bodyPr>
+          <a:lstStyle/>
+          <a:p>
+            <a:r>
+              <a:rPr lang="de-DE" sz="1400" b="0" cap="none" spc="0" dirty="0">
+                <a:ln w="0"/>
+                <a:solidFill>
+                  <a:schemeClr val="tx1"/>
+                </a:solidFill>
+                <a:effectLst>
+                  <a:outerShdw blurRad="38100" dist="19050" dir="2700000" algn="tl" rotWithShape="0">
+                    <a:schemeClr val="dk1">
+                      <a:alpha val="40000"/>
+                    </a:schemeClr>
+                  </a:outerShdw>
+                </a:effectLst>
+              </a:rPr>
+              <a:t>Hier muss der User die Softwareversion</a:t>
+            </a:r>
+          </a:p>
+          <a:p>
+            <a:r>
+              <a:rPr lang="de-DE" sz="1400" dirty="0">
+                <a:ln w="0"/>
+                <a:effectLst>
+                  <a:outerShdw blurRad="38100" dist="19050" dir="2700000" algn="tl" rotWithShape="0">
+                    <a:schemeClr val="dk1">
+                      <a:alpha val="40000"/>
+                    </a:schemeClr>
+                  </a:outerShdw>
+                </a:effectLst>
+              </a:rPr>
+              <a:t>d</a:t>
+            </a:r>
+            <a:r>
+              <a:rPr lang="de-DE" sz="1400" b="0" cap="none" spc="0" dirty="0">
+                <a:ln w="0"/>
+                <a:solidFill>
+                  <a:schemeClr val="tx1"/>
+                </a:solidFill>
+                <a:effectLst>
+                  <a:outerShdw blurRad="38100" dist="19050" dir="2700000" algn="tl" rotWithShape="0">
+                    <a:schemeClr val="dk1">
+                      <a:alpha val="40000"/>
+                    </a:schemeClr>
+                  </a:outerShdw>
+                </a:effectLst>
+              </a:rPr>
+              <a:t>er neuen Software eintragen</a:t>
+            </a:r>
+          </a:p>
+        </p:txBody>
+      </p:sp>
+      <p:cxnSp>
+        <p:nvCxnSpPr>
+          <p:cNvPr id="48" name="Gerade Verbindung mit Pfeil 47"/>
+          <p:cNvCxnSpPr>
+            <a:cxnSpLocks/>
+          </p:cNvCxnSpPr>
+          <p:nvPr/>
+        </p:nvCxnSpPr>
+        <p:spPr>
+          <a:xfrm flipH="1" flipV="1">
+            <a:off x="6830605" y="4502610"/>
+            <a:ext cx="649355" cy="4572"/>
+          </a:xfrm>
+          <a:prstGeom prst="straightConnector1">
+            <a:avLst/>
+          </a:prstGeom>
+          <a:ln>
+            <a:tailEnd type="triangle"/>
+          </a:ln>
+        </p:spPr>
+        <p:style>
+          <a:lnRef idx="3">
+            <a:schemeClr val="accent2"/>
+          </a:lnRef>
+          <a:fillRef idx="0">
+            <a:schemeClr val="accent2"/>
+          </a:fillRef>
+          <a:effectRef idx="2">
+            <a:schemeClr val="accent2"/>
+          </a:effectRef>
+          <a:fontRef idx="minor">
+            <a:schemeClr val="tx1"/>
+          </a:fontRef>
+        </p:style>
+      </p:cxnSp>
+      <p:sp>
+        <p:nvSpPr>
+          <p:cNvPr id="49" name="Rechteck 48"/>
+          <p:cNvSpPr/>
+          <p:nvPr/>
+        </p:nvSpPr>
+        <p:spPr>
+          <a:xfrm>
+            <a:off x="7479960" y="4231838"/>
+            <a:ext cx="2928559" cy="523220"/>
+          </a:xfrm>
+          <a:prstGeom prst="rect">
+            <a:avLst/>
+          </a:prstGeom>
+          <a:noFill/>
+        </p:spPr>
+        <p:txBody>
+          <a:bodyPr wrap="none" lIns="91440" tIns="45720" rIns="91440" bIns="45720">
+            <a:spAutoFit/>
+          </a:bodyPr>
+          <a:lstStyle/>
+          <a:p>
+            <a:r>
+              <a:rPr lang="de-DE" sz="1400" b="0" cap="none" spc="0" dirty="0">
+                <a:ln w="0"/>
+                <a:solidFill>
+                  <a:schemeClr val="tx1"/>
+                </a:solidFill>
+                <a:effectLst>
+                  <a:outerShdw blurRad="38100" dist="19050" dir="2700000" algn="tl" rotWithShape="0">
+                    <a:schemeClr val="dk1">
+                      <a:alpha val="40000"/>
+                    </a:schemeClr>
+                  </a:outerShdw>
+                </a:effectLst>
+              </a:rPr>
+              <a:t>Hier muss der User die Softwarelizenz</a:t>
+            </a:r>
+          </a:p>
+          <a:p>
+            <a:r>
+              <a:rPr lang="de-DE" sz="1400" dirty="0">
+                <a:ln w="0"/>
+                <a:effectLst>
+                  <a:outerShdw blurRad="38100" dist="19050" dir="2700000" algn="tl" rotWithShape="0">
+                    <a:schemeClr val="dk1">
+                      <a:alpha val="40000"/>
+                    </a:schemeClr>
+                  </a:outerShdw>
+                </a:effectLst>
+              </a:rPr>
+              <a:t>d</a:t>
+            </a:r>
+            <a:r>
+              <a:rPr lang="de-DE" sz="1400" b="0" cap="none" spc="0" dirty="0">
+                <a:ln w="0"/>
+                <a:solidFill>
+                  <a:schemeClr val="tx1"/>
+                </a:solidFill>
+                <a:effectLst>
+                  <a:outerShdw blurRad="38100" dist="19050" dir="2700000" algn="tl" rotWithShape="0">
+                    <a:schemeClr val="dk1">
+                      <a:alpha val="40000"/>
+                    </a:schemeClr>
+                  </a:outerShdw>
+                </a:effectLst>
+              </a:rPr>
+              <a:t>er neuen Software eintragen</a:t>
+            </a:r>
+          </a:p>
+        </p:txBody>
+      </p:sp>
+      <p:cxnSp>
+        <p:nvCxnSpPr>
+          <p:cNvPr id="50" name="Gerade Verbindung mit Pfeil 49"/>
+          <p:cNvCxnSpPr>
+            <a:cxnSpLocks/>
+          </p:cNvCxnSpPr>
+          <p:nvPr/>
+        </p:nvCxnSpPr>
+        <p:spPr>
+          <a:xfrm>
+            <a:off x="2501177" y="5884816"/>
+            <a:ext cx="560075" cy="279379"/>
+          </a:xfrm>
+          <a:prstGeom prst="straightConnector1">
+            <a:avLst/>
+          </a:prstGeom>
+          <a:ln>
+            <a:tailEnd type="triangle"/>
+          </a:ln>
+        </p:spPr>
+        <p:style>
+          <a:lnRef idx="3">
+            <a:schemeClr val="accent2"/>
+          </a:lnRef>
+          <a:fillRef idx="0">
+            <a:schemeClr val="accent2"/>
+          </a:fillRef>
+          <a:effectRef idx="2">
+            <a:schemeClr val="accent2"/>
+          </a:effectRef>
+          <a:fontRef idx="minor">
+            <a:schemeClr val="tx1"/>
+          </a:fontRef>
+        </p:style>
+      </p:cxnSp>
+      <p:sp>
+        <p:nvSpPr>
+          <p:cNvPr id="51" name="Rechteck 50"/>
+          <p:cNvSpPr/>
+          <p:nvPr/>
+        </p:nvSpPr>
+        <p:spPr>
+          <a:xfrm>
+            <a:off x="383131" y="5448126"/>
+            <a:ext cx="2462534" cy="738664"/>
+          </a:xfrm>
+          <a:prstGeom prst="rect">
+            <a:avLst/>
+          </a:prstGeom>
+          <a:noFill/>
+        </p:spPr>
+        <p:txBody>
+          <a:bodyPr wrap="square" lIns="91440" tIns="45720" rIns="91440" bIns="45720">
+            <a:spAutoFit/>
+          </a:bodyPr>
+          <a:lstStyle/>
+          <a:p>
+            <a:r>
+              <a:rPr lang="de-DE" sz="1400" b="0" cap="none" spc="0" dirty="0">
+                <a:ln w="0"/>
+                <a:solidFill>
+                  <a:schemeClr val="tx1"/>
+                </a:solidFill>
+                <a:effectLst>
+                  <a:outerShdw blurRad="38100" dist="38100" dir="2700000" algn="tl">
+                    <a:srgbClr val="000000">
+                      <a:alpha val="43137"/>
+                    </a:srgbClr>
+                  </a:outerShdw>
+                </a:effectLst>
+              </a:rPr>
+              <a:t>Beim Klick auf diesen Button werden die eingetragenen Informationen gelöscht</a:t>
+            </a:r>
+          </a:p>
+        </p:txBody>
+      </p:sp>
+      <p:cxnSp>
+        <p:nvCxnSpPr>
+          <p:cNvPr id="52" name="Gerade Verbindung mit Pfeil 51"/>
+          <p:cNvCxnSpPr>
+            <a:cxnSpLocks/>
+          </p:cNvCxnSpPr>
+          <p:nvPr/>
+        </p:nvCxnSpPr>
+        <p:spPr>
+          <a:xfrm flipH="1">
+            <a:off x="6990522" y="5880756"/>
+            <a:ext cx="775252" cy="306034"/>
+          </a:xfrm>
+          <a:prstGeom prst="straightConnector1">
+            <a:avLst/>
+          </a:prstGeom>
+          <a:ln>
+            <a:tailEnd type="triangle"/>
+          </a:ln>
+        </p:spPr>
+        <p:style>
+          <a:lnRef idx="3">
+            <a:schemeClr val="accent2"/>
+          </a:lnRef>
+          <a:fillRef idx="0">
+            <a:schemeClr val="accent2"/>
+          </a:fillRef>
+          <a:effectRef idx="2">
+            <a:schemeClr val="accent2"/>
+          </a:effectRef>
+          <a:fontRef idx="minor">
+            <a:schemeClr val="tx1"/>
+          </a:fontRef>
+        </p:style>
+      </p:cxnSp>
+      <p:sp>
+        <p:nvSpPr>
+          <p:cNvPr id="53" name="Rechteck 52"/>
+          <p:cNvSpPr/>
+          <p:nvPr/>
+        </p:nvSpPr>
+        <p:spPr>
+          <a:xfrm>
+            <a:off x="7765772" y="5713952"/>
+            <a:ext cx="2462534" cy="738664"/>
+          </a:xfrm>
+          <a:prstGeom prst="rect">
+            <a:avLst/>
+          </a:prstGeom>
+          <a:noFill/>
+        </p:spPr>
+        <p:txBody>
+          <a:bodyPr wrap="square" lIns="91440" tIns="45720" rIns="91440" bIns="45720">
+            <a:spAutoFit/>
+          </a:bodyPr>
+          <a:lstStyle/>
+          <a:p>
+            <a:r>
+              <a:rPr lang="de-DE" sz="1400" b="0" cap="none" spc="0" dirty="0">
+                <a:ln w="0"/>
+                <a:solidFill>
+                  <a:schemeClr val="tx1"/>
+                </a:solidFill>
+                <a:effectLst>
+                  <a:outerShdw blurRad="38100" dist="38100" dir="2700000" algn="tl">
+                    <a:srgbClr val="000000">
+                      <a:alpha val="43137"/>
+                    </a:srgbClr>
+                  </a:outerShdw>
+                </a:effectLst>
+              </a:rPr>
+              <a:t>Beim Klick auf diesen Button wird die neue Software in der Datenbank angelegt</a:t>
+            </a:r>
+          </a:p>
+        </p:txBody>
+      </p:sp>
     </p:spTree>
     <p:extLst>
       <p:ext uri="{BB962C8B-B14F-4D97-AF65-F5344CB8AC3E}">
@@ -11662,6 +12212,466 @@
           </a:p>
         </p:txBody>
       </p:sp>
+      <p:cxnSp>
+        <p:nvCxnSpPr>
+          <p:cNvPr id="21" name="Gerade Verbindung mit Pfeil 20"/>
+          <p:cNvCxnSpPr>
+            <a:cxnSpLocks/>
+          </p:cNvCxnSpPr>
+          <p:nvPr/>
+        </p:nvCxnSpPr>
+        <p:spPr>
+          <a:xfrm flipH="1" flipV="1">
+            <a:off x="6758610" y="2504661"/>
+            <a:ext cx="649355" cy="4572"/>
+          </a:xfrm>
+          <a:prstGeom prst="straightConnector1">
+            <a:avLst/>
+          </a:prstGeom>
+          <a:ln>
+            <a:tailEnd type="triangle"/>
+          </a:ln>
+        </p:spPr>
+        <p:style>
+          <a:lnRef idx="3">
+            <a:schemeClr val="accent2"/>
+          </a:lnRef>
+          <a:fillRef idx="0">
+            <a:schemeClr val="accent2"/>
+          </a:fillRef>
+          <a:effectRef idx="2">
+            <a:schemeClr val="accent2"/>
+          </a:effectRef>
+          <a:fontRef idx="minor">
+            <a:schemeClr val="tx1"/>
+          </a:fontRef>
+        </p:style>
+      </p:cxnSp>
+      <p:sp>
+        <p:nvSpPr>
+          <p:cNvPr id="22" name="Rechteck 21"/>
+          <p:cNvSpPr/>
+          <p:nvPr/>
+        </p:nvSpPr>
+        <p:spPr>
+          <a:xfrm>
+            <a:off x="7407965" y="2233889"/>
+            <a:ext cx="2929007" cy="523220"/>
+          </a:xfrm>
+          <a:prstGeom prst="rect">
+            <a:avLst/>
+          </a:prstGeom>
+          <a:noFill/>
+        </p:spPr>
+        <p:txBody>
+          <a:bodyPr wrap="none" lIns="91440" tIns="45720" rIns="91440" bIns="45720">
+            <a:spAutoFit/>
+          </a:bodyPr>
+          <a:lstStyle/>
+          <a:p>
+            <a:r>
+              <a:rPr lang="de-DE" sz="1400" b="0" cap="none" spc="0" dirty="0">
+                <a:ln w="0"/>
+                <a:solidFill>
+                  <a:schemeClr val="tx1"/>
+                </a:solidFill>
+                <a:effectLst>
+                  <a:outerShdw blurRad="38100" dist="19050" dir="2700000" algn="tl" rotWithShape="0">
+                    <a:schemeClr val="dk1">
+                      <a:alpha val="40000"/>
+                    </a:schemeClr>
+                  </a:outerShdw>
+                </a:effectLst>
+              </a:rPr>
+              <a:t>Hier muss der User die Raumnummer</a:t>
+            </a:r>
+          </a:p>
+          <a:p>
+            <a:r>
+              <a:rPr lang="de-DE" sz="1400" dirty="0">
+                <a:ln w="0"/>
+                <a:effectLst>
+                  <a:outerShdw blurRad="38100" dist="19050" dir="2700000" algn="tl" rotWithShape="0">
+                    <a:schemeClr val="dk1">
+                      <a:alpha val="40000"/>
+                    </a:schemeClr>
+                  </a:outerShdw>
+                </a:effectLst>
+              </a:rPr>
+              <a:t>des neuen Raumes </a:t>
+            </a:r>
+            <a:r>
+              <a:rPr lang="de-DE" sz="1400" b="0" cap="none" spc="0" dirty="0">
+                <a:ln w="0"/>
+                <a:solidFill>
+                  <a:schemeClr val="tx1"/>
+                </a:solidFill>
+                <a:effectLst>
+                  <a:outerShdw blurRad="38100" dist="19050" dir="2700000" algn="tl" rotWithShape="0">
+                    <a:schemeClr val="dk1">
+                      <a:alpha val="40000"/>
+                    </a:schemeClr>
+                  </a:outerShdw>
+                </a:effectLst>
+              </a:rPr>
+              <a:t>eintragen</a:t>
+            </a:r>
+          </a:p>
+        </p:txBody>
+      </p:sp>
+      <p:sp>
+        <p:nvSpPr>
+          <p:cNvPr id="24" name="Rechteck 23"/>
+          <p:cNvSpPr/>
+          <p:nvPr/>
+        </p:nvSpPr>
+        <p:spPr>
+          <a:xfrm>
+            <a:off x="6838122" y="1622055"/>
+            <a:ext cx="4366516" cy="307777"/>
+          </a:xfrm>
+          <a:prstGeom prst="rect">
+            <a:avLst/>
+          </a:prstGeom>
+          <a:noFill/>
+        </p:spPr>
+        <p:txBody>
+          <a:bodyPr wrap="none" lIns="91440" tIns="45720" rIns="91440" bIns="45720">
+            <a:spAutoFit/>
+          </a:bodyPr>
+          <a:lstStyle/>
+          <a:p>
+            <a:r>
+              <a:rPr lang="de-DE" sz="1400" b="0" cap="none" spc="0" dirty="0">
+                <a:ln w="0"/>
+                <a:solidFill>
+                  <a:schemeClr val="tx1"/>
+                </a:solidFill>
+                <a:effectLst>
+                  <a:outerShdw blurRad="38100" dist="38100" dir="2700000" algn="tl">
+                    <a:srgbClr val="000000">
+                      <a:alpha val="43137"/>
+                    </a:srgbClr>
+                  </a:outerShdw>
+                </a:effectLst>
+              </a:rPr>
+              <a:t>Dies ist nur ein Beispiel an Informationen, weitere folgen.</a:t>
+            </a:r>
+          </a:p>
+        </p:txBody>
+      </p:sp>
+      <p:cxnSp>
+        <p:nvCxnSpPr>
+          <p:cNvPr id="26" name="Gerade Verbindung mit Pfeil 25"/>
+          <p:cNvCxnSpPr>
+            <a:cxnSpLocks/>
+            <a:stCxn id="24" idx="1"/>
+          </p:cNvCxnSpPr>
+          <p:nvPr/>
+        </p:nvCxnSpPr>
+        <p:spPr>
+          <a:xfrm flipH="1">
+            <a:off x="6420204" y="1775944"/>
+            <a:ext cx="417918" cy="457945"/>
+          </a:xfrm>
+          <a:prstGeom prst="straightConnector1">
+            <a:avLst/>
+          </a:prstGeom>
+          <a:ln>
+            <a:tailEnd type="triangle"/>
+          </a:ln>
+        </p:spPr>
+        <p:style>
+          <a:lnRef idx="3">
+            <a:schemeClr val="accent2"/>
+          </a:lnRef>
+          <a:fillRef idx="0">
+            <a:schemeClr val="accent2"/>
+          </a:fillRef>
+          <a:effectRef idx="2">
+            <a:schemeClr val="accent2"/>
+          </a:effectRef>
+          <a:fontRef idx="minor">
+            <a:schemeClr val="tx1"/>
+          </a:fontRef>
+        </p:style>
+      </p:cxnSp>
+      <p:cxnSp>
+        <p:nvCxnSpPr>
+          <p:cNvPr id="27" name="Gerade Verbindung mit Pfeil 26"/>
+          <p:cNvCxnSpPr>
+            <a:cxnSpLocks/>
+          </p:cNvCxnSpPr>
+          <p:nvPr/>
+        </p:nvCxnSpPr>
+        <p:spPr>
+          <a:xfrm flipH="1" flipV="1">
+            <a:off x="6758610" y="3982863"/>
+            <a:ext cx="649355" cy="4572"/>
+          </a:xfrm>
+          <a:prstGeom prst="straightConnector1">
+            <a:avLst/>
+          </a:prstGeom>
+          <a:ln>
+            <a:tailEnd type="triangle"/>
+          </a:ln>
+        </p:spPr>
+        <p:style>
+          <a:lnRef idx="3">
+            <a:schemeClr val="accent2"/>
+          </a:lnRef>
+          <a:fillRef idx="0">
+            <a:schemeClr val="accent2"/>
+          </a:fillRef>
+          <a:effectRef idx="2">
+            <a:schemeClr val="accent2"/>
+          </a:effectRef>
+          <a:fontRef idx="minor">
+            <a:schemeClr val="tx1"/>
+          </a:fontRef>
+        </p:style>
+      </p:cxnSp>
+      <p:sp>
+        <p:nvSpPr>
+          <p:cNvPr id="32" name="Rechteck 31"/>
+          <p:cNvSpPr/>
+          <p:nvPr/>
+        </p:nvSpPr>
+        <p:spPr>
+          <a:xfrm>
+            <a:off x="7407965" y="3712091"/>
+            <a:ext cx="2418867" cy="523220"/>
+          </a:xfrm>
+          <a:prstGeom prst="rect">
+            <a:avLst/>
+          </a:prstGeom>
+          <a:noFill/>
+        </p:spPr>
+        <p:txBody>
+          <a:bodyPr wrap="none" lIns="91440" tIns="45720" rIns="91440" bIns="45720">
+            <a:spAutoFit/>
+          </a:bodyPr>
+          <a:lstStyle/>
+          <a:p>
+            <a:r>
+              <a:rPr lang="de-DE" sz="1400" b="0" cap="none" spc="0" dirty="0">
+                <a:ln w="0"/>
+                <a:solidFill>
+                  <a:schemeClr val="tx1"/>
+                </a:solidFill>
+                <a:effectLst>
+                  <a:outerShdw blurRad="38100" dist="19050" dir="2700000" algn="tl" rotWithShape="0">
+                    <a:schemeClr val="dk1">
+                      <a:alpha val="40000"/>
+                    </a:schemeClr>
+                  </a:outerShdw>
+                </a:effectLst>
+              </a:rPr>
+              <a:t>Hier muss der User Notizen </a:t>
+            </a:r>
+          </a:p>
+          <a:p>
+            <a:r>
+              <a:rPr lang="de-DE" sz="1400" b="0" cap="none" spc="0" dirty="0">
+                <a:ln w="0"/>
+                <a:solidFill>
+                  <a:schemeClr val="tx1"/>
+                </a:solidFill>
+                <a:effectLst>
+                  <a:outerShdw blurRad="38100" dist="19050" dir="2700000" algn="tl" rotWithShape="0">
+                    <a:schemeClr val="dk1">
+                      <a:alpha val="40000"/>
+                    </a:schemeClr>
+                  </a:outerShdw>
+                </a:effectLst>
+              </a:rPr>
+              <a:t>für den</a:t>
+            </a:r>
+            <a:r>
+              <a:rPr lang="de-DE" sz="1400" dirty="0">
+                <a:ln w="0"/>
+                <a:effectLst>
+                  <a:outerShdw blurRad="38100" dist="19050" dir="2700000" algn="tl" rotWithShape="0">
+                    <a:schemeClr val="dk1">
+                      <a:alpha val="40000"/>
+                    </a:schemeClr>
+                  </a:outerShdw>
+                </a:effectLst>
+              </a:rPr>
+              <a:t> neuen Raum </a:t>
+            </a:r>
+            <a:r>
+              <a:rPr lang="de-DE" sz="1400" b="0" cap="none" spc="0" dirty="0">
+                <a:ln w="0"/>
+                <a:solidFill>
+                  <a:schemeClr val="tx1"/>
+                </a:solidFill>
+                <a:effectLst>
+                  <a:outerShdw blurRad="38100" dist="19050" dir="2700000" algn="tl" rotWithShape="0">
+                    <a:schemeClr val="dk1">
+                      <a:alpha val="40000"/>
+                    </a:schemeClr>
+                  </a:outerShdw>
+                </a:effectLst>
+              </a:rPr>
+              <a:t>eintragen</a:t>
+            </a:r>
+          </a:p>
+        </p:txBody>
+      </p:sp>
+      <p:cxnSp>
+        <p:nvCxnSpPr>
+          <p:cNvPr id="33" name="Gerade Verbindung mit Pfeil 32"/>
+          <p:cNvCxnSpPr>
+            <a:cxnSpLocks/>
+          </p:cNvCxnSpPr>
+          <p:nvPr/>
+        </p:nvCxnSpPr>
+        <p:spPr>
+          <a:xfrm flipV="1">
+            <a:off x="2451652" y="5295270"/>
+            <a:ext cx="609599" cy="522434"/>
+          </a:xfrm>
+          <a:prstGeom prst="straightConnector1">
+            <a:avLst/>
+          </a:prstGeom>
+          <a:ln>
+            <a:tailEnd type="triangle"/>
+          </a:ln>
+        </p:spPr>
+        <p:style>
+          <a:lnRef idx="3">
+            <a:schemeClr val="accent2"/>
+          </a:lnRef>
+          <a:fillRef idx="0">
+            <a:schemeClr val="accent2"/>
+          </a:fillRef>
+          <a:effectRef idx="2">
+            <a:schemeClr val="accent2"/>
+          </a:effectRef>
+          <a:fontRef idx="minor">
+            <a:schemeClr val="tx1"/>
+          </a:fontRef>
+        </p:style>
+      </p:cxnSp>
+      <p:sp>
+        <p:nvSpPr>
+          <p:cNvPr id="34" name="Rechteck 33"/>
+          <p:cNvSpPr/>
+          <p:nvPr/>
+        </p:nvSpPr>
+        <p:spPr>
+          <a:xfrm>
+            <a:off x="383131" y="5448126"/>
+            <a:ext cx="2462534" cy="738664"/>
+          </a:xfrm>
+          <a:prstGeom prst="rect">
+            <a:avLst/>
+          </a:prstGeom>
+          <a:noFill/>
+        </p:spPr>
+        <p:txBody>
+          <a:bodyPr wrap="square" lIns="91440" tIns="45720" rIns="91440" bIns="45720">
+            <a:spAutoFit/>
+          </a:bodyPr>
+          <a:lstStyle/>
+          <a:p>
+            <a:r>
+              <a:rPr lang="de-DE" sz="1400" b="0" cap="none" spc="0" dirty="0">
+                <a:ln w="0"/>
+                <a:solidFill>
+                  <a:schemeClr val="tx1"/>
+                </a:solidFill>
+                <a:effectLst>
+                  <a:outerShdw blurRad="38100" dist="38100" dir="2700000" algn="tl">
+                    <a:srgbClr val="000000">
+                      <a:alpha val="43137"/>
+                    </a:srgbClr>
+                  </a:outerShdw>
+                </a:effectLst>
+              </a:rPr>
+              <a:t>Beim Klick auf diesen Button werden die eingetragenen Informationen gelöscht</a:t>
+            </a:r>
+          </a:p>
+        </p:txBody>
+      </p:sp>
+      <p:cxnSp>
+        <p:nvCxnSpPr>
+          <p:cNvPr id="35" name="Gerade Verbindung mit Pfeil 34"/>
+          <p:cNvCxnSpPr>
+            <a:cxnSpLocks/>
+            <a:endCxn id="44" idx="3"/>
+          </p:cNvCxnSpPr>
+          <p:nvPr/>
+        </p:nvCxnSpPr>
+        <p:spPr>
+          <a:xfrm flipH="1" flipV="1">
+            <a:off x="7116417" y="5109739"/>
+            <a:ext cx="775252" cy="425496"/>
+          </a:xfrm>
+          <a:prstGeom prst="straightConnector1">
+            <a:avLst/>
+          </a:prstGeom>
+          <a:ln>
+            <a:tailEnd type="triangle"/>
+          </a:ln>
+        </p:spPr>
+        <p:style>
+          <a:lnRef idx="3">
+            <a:schemeClr val="accent2"/>
+          </a:lnRef>
+          <a:fillRef idx="0">
+            <a:schemeClr val="accent2"/>
+          </a:fillRef>
+          <a:effectRef idx="2">
+            <a:schemeClr val="accent2"/>
+          </a:effectRef>
+          <a:fontRef idx="minor">
+            <a:schemeClr val="tx1"/>
+          </a:fontRef>
+        </p:style>
+      </p:cxnSp>
+      <p:sp>
+        <p:nvSpPr>
+          <p:cNvPr id="40" name="Rechteck 39"/>
+          <p:cNvSpPr/>
+          <p:nvPr/>
+        </p:nvSpPr>
+        <p:spPr>
+          <a:xfrm>
+            <a:off x="7891667" y="5368431"/>
+            <a:ext cx="2462534" cy="738664"/>
+          </a:xfrm>
+          <a:prstGeom prst="rect">
+            <a:avLst/>
+          </a:prstGeom>
+          <a:noFill/>
+        </p:spPr>
+        <p:txBody>
+          <a:bodyPr wrap="square" lIns="91440" tIns="45720" rIns="91440" bIns="45720">
+            <a:spAutoFit/>
+          </a:bodyPr>
+          <a:lstStyle/>
+          <a:p>
+            <a:r>
+              <a:rPr lang="de-DE" sz="1400" b="0" cap="none" spc="0" dirty="0">
+                <a:ln w="0"/>
+                <a:solidFill>
+                  <a:schemeClr val="tx1"/>
+                </a:solidFill>
+                <a:effectLst>
+                  <a:outerShdw blurRad="38100" dist="38100" dir="2700000" algn="tl">
+                    <a:srgbClr val="000000">
+                      <a:alpha val="43137"/>
+                    </a:srgbClr>
+                  </a:outerShdw>
+                </a:effectLst>
+              </a:rPr>
+              <a:t>Beim Klick auf diesen Button wird der neue Raum in der Datenbank angelegt</a:t>
+            </a:r>
+          </a:p>
+        </p:txBody>
+      </p:sp>
     </p:spTree>
     <p:extLst>
       <p:ext uri="{BB962C8B-B14F-4D97-AF65-F5344CB8AC3E}">
@@ -21534,49 +22544,6 @@
       </p:sp>
       <p:sp>
         <p:nvSpPr>
-          <p:cNvPr id="37" name="Rechteck 36"/>
-          <p:cNvSpPr/>
-          <p:nvPr/>
-        </p:nvSpPr>
-        <p:spPr>
-          <a:xfrm>
-            <a:off x="3061252" y="3300751"/>
-            <a:ext cx="4055165" cy="357809"/>
-          </a:xfrm>
-          <a:prstGeom prst="rect">
-            <a:avLst/>
-          </a:prstGeom>
-          <a:ln>
-            <a:solidFill>
-              <a:schemeClr val="tx1"/>
-            </a:solidFill>
-          </a:ln>
-        </p:spPr>
-        <p:style>
-          <a:lnRef idx="2">
-            <a:schemeClr val="accent6"/>
-          </a:lnRef>
-          <a:fillRef idx="1">
-            <a:schemeClr val="lt1"/>
-          </a:fillRef>
-          <a:effectRef idx="0">
-            <a:schemeClr val="accent6"/>
-          </a:effectRef>
-          <a:fontRef idx="minor">
-            <a:schemeClr val="dk1"/>
-          </a:fontRef>
-        </p:style>
-        <p:txBody>
-          <a:bodyPr rtlCol="0" anchor="ctr"/>
-          <a:lstStyle/>
-          <a:p>
-            <a:pPr algn="ctr"/>
-            <a:endParaRPr lang="de-DE" dirty="0"/>
-          </a:p>
-        </p:txBody>
-      </p:sp>
-      <p:sp>
-        <p:nvSpPr>
           <p:cNvPr id="38" name="Rechteck 37"/>
           <p:cNvSpPr/>
           <p:nvPr/>
@@ -21628,13 +22595,99 @@
       </p:sp>
       <p:sp>
         <p:nvSpPr>
-          <p:cNvPr id="39" name="Rechteck 38"/>
-          <p:cNvSpPr/>
-          <p:nvPr/>
-        </p:nvSpPr>
-        <p:spPr>
-          <a:xfrm>
-            <a:off x="3061251" y="2772077"/>
+          <p:cNvPr id="40" name="Rechteck 39"/>
+          <p:cNvSpPr/>
+          <p:nvPr/>
+        </p:nvSpPr>
+        <p:spPr>
+          <a:xfrm>
+            <a:off x="3061254" y="3326747"/>
+            <a:ext cx="4055165" cy="357809"/>
+          </a:xfrm>
+          <a:prstGeom prst="rect">
+            <a:avLst/>
+          </a:prstGeom>
+          <a:ln>
+            <a:solidFill>
+              <a:schemeClr val="tx1"/>
+            </a:solidFill>
+          </a:ln>
+        </p:spPr>
+        <p:style>
+          <a:lnRef idx="2">
+            <a:schemeClr val="accent6"/>
+          </a:lnRef>
+          <a:fillRef idx="1">
+            <a:schemeClr val="lt1"/>
+          </a:fillRef>
+          <a:effectRef idx="0">
+            <a:schemeClr val="accent6"/>
+          </a:effectRef>
+          <a:fontRef idx="minor">
+            <a:schemeClr val="dk1"/>
+          </a:fontRef>
+        </p:style>
+        <p:txBody>
+          <a:bodyPr rtlCol="0" anchor="ctr"/>
+          <a:lstStyle/>
+          <a:p>
+            <a:pPr algn="ctr"/>
+            <a:endParaRPr lang="de-DE"/>
+          </a:p>
+        </p:txBody>
+      </p:sp>
+      <p:sp>
+        <p:nvSpPr>
+          <p:cNvPr id="41" name="Rechteck 40"/>
+          <p:cNvSpPr/>
+          <p:nvPr/>
+        </p:nvSpPr>
+        <p:spPr>
+          <a:xfrm>
+            <a:off x="3061254" y="4310083"/>
+            <a:ext cx="4055165" cy="357809"/>
+          </a:xfrm>
+          <a:prstGeom prst="rect">
+            <a:avLst/>
+          </a:prstGeom>
+          <a:ln>
+            <a:solidFill>
+              <a:schemeClr val="tx1"/>
+            </a:solidFill>
+          </a:ln>
+        </p:spPr>
+        <p:style>
+          <a:lnRef idx="2">
+            <a:schemeClr val="accent6"/>
+          </a:lnRef>
+          <a:fillRef idx="1">
+            <a:schemeClr val="lt1"/>
+          </a:fillRef>
+          <a:effectRef idx="0">
+            <a:schemeClr val="accent6"/>
+          </a:effectRef>
+          <a:fontRef idx="minor">
+            <a:schemeClr val="dk1"/>
+          </a:fontRef>
+        </p:style>
+        <p:txBody>
+          <a:bodyPr rtlCol="0" anchor="ctr"/>
+          <a:lstStyle/>
+          <a:p>
+            <a:pPr algn="ctr"/>
+            <a:endParaRPr lang="de-DE" dirty="0"/>
+          </a:p>
+        </p:txBody>
+      </p:sp>
+      <p:sp>
+        <p:nvSpPr>
+          <p:cNvPr id="42" name="Rechteck 41"/>
+          <p:cNvSpPr/>
+          <p:nvPr/>
+        </p:nvSpPr>
+        <p:spPr>
+          <a:xfrm>
+            <a:off x="3061252" y="2829174"/>
             <a:ext cx="3358955" cy="523220"/>
           </a:xfrm>
           <a:prstGeom prst="rect">
@@ -21659,7 +22712,7 @@
                   </a:outerShdw>
                 </a:effectLst>
               </a:rPr>
-              <a:t>Passwort</a:t>
+              <a:t>Adresse</a:t>
             </a:r>
             <a:endParaRPr lang="de-DE" sz="2800" b="0" cap="none" spc="0" dirty="0">
               <a:ln w="0"/>
@@ -21679,99 +22732,13 @@
       </p:sp>
       <p:sp>
         <p:nvSpPr>
-          <p:cNvPr id="40" name="Rechteck 39"/>
-          <p:cNvSpPr/>
-          <p:nvPr/>
-        </p:nvSpPr>
-        <p:spPr>
-          <a:xfrm>
-            <a:off x="3061252" y="4320560"/>
-            <a:ext cx="4055165" cy="357809"/>
-          </a:xfrm>
-          <a:prstGeom prst="rect">
-            <a:avLst/>
-          </a:prstGeom>
-          <a:ln>
-            <a:solidFill>
-              <a:schemeClr val="tx1"/>
-            </a:solidFill>
-          </a:ln>
-        </p:spPr>
-        <p:style>
-          <a:lnRef idx="2">
-            <a:schemeClr val="accent6"/>
-          </a:lnRef>
-          <a:fillRef idx="1">
-            <a:schemeClr val="lt1"/>
-          </a:fillRef>
-          <a:effectRef idx="0">
-            <a:schemeClr val="accent6"/>
-          </a:effectRef>
-          <a:fontRef idx="minor">
-            <a:schemeClr val="dk1"/>
-          </a:fontRef>
-        </p:style>
-        <p:txBody>
-          <a:bodyPr rtlCol="0" anchor="ctr"/>
-          <a:lstStyle/>
-          <a:p>
-            <a:pPr algn="ctr"/>
-            <a:endParaRPr lang="de-DE"/>
-          </a:p>
-        </p:txBody>
-      </p:sp>
-      <p:sp>
-        <p:nvSpPr>
-          <p:cNvPr id="41" name="Rechteck 40"/>
-          <p:cNvSpPr/>
-          <p:nvPr/>
-        </p:nvSpPr>
-        <p:spPr>
-          <a:xfrm>
-            <a:off x="3061252" y="5303896"/>
-            <a:ext cx="4055165" cy="357809"/>
-          </a:xfrm>
-          <a:prstGeom prst="rect">
-            <a:avLst/>
-          </a:prstGeom>
-          <a:ln>
-            <a:solidFill>
-              <a:schemeClr val="tx1"/>
-            </a:solidFill>
-          </a:ln>
-        </p:spPr>
-        <p:style>
-          <a:lnRef idx="2">
-            <a:schemeClr val="accent6"/>
-          </a:lnRef>
-          <a:fillRef idx="1">
-            <a:schemeClr val="lt1"/>
-          </a:fillRef>
-          <a:effectRef idx="0">
-            <a:schemeClr val="accent6"/>
-          </a:effectRef>
-          <a:fontRef idx="minor">
-            <a:schemeClr val="dk1"/>
-          </a:fontRef>
-        </p:style>
-        <p:txBody>
-          <a:bodyPr rtlCol="0" anchor="ctr"/>
-          <a:lstStyle/>
-          <a:p>
-            <a:pPr algn="ctr"/>
-            <a:endParaRPr lang="de-DE" dirty="0"/>
-          </a:p>
-        </p:txBody>
-      </p:sp>
-      <p:sp>
-        <p:nvSpPr>
-          <p:cNvPr id="42" name="Rechteck 41"/>
-          <p:cNvSpPr/>
-          <p:nvPr/>
-        </p:nvSpPr>
-        <p:spPr>
-          <a:xfrm>
-            <a:off x="3061250" y="3822987"/>
+          <p:cNvPr id="43" name="Rechteck 42"/>
+          <p:cNvSpPr/>
+          <p:nvPr/>
+        </p:nvSpPr>
+        <p:spPr>
+          <a:xfrm>
+            <a:off x="3061251" y="3776665"/>
             <a:ext cx="3358955" cy="523220"/>
           </a:xfrm>
           <a:prstGeom prst="rect">
@@ -21796,7 +22763,7 @@
                   </a:outerShdw>
                 </a:effectLst>
               </a:rPr>
-              <a:t>Adresse</a:t>
+              <a:t>Name</a:t>
             </a:r>
             <a:endParaRPr lang="de-DE" sz="2800" b="0" cap="none" spc="0" dirty="0">
               <a:ln w="0"/>
@@ -21816,64 +22783,13 @@
       </p:sp>
       <p:sp>
         <p:nvSpPr>
-          <p:cNvPr id="43" name="Rechteck 42"/>
-          <p:cNvSpPr/>
-          <p:nvPr/>
-        </p:nvSpPr>
-        <p:spPr>
-          <a:xfrm>
-            <a:off x="3061249" y="4770478"/>
-            <a:ext cx="3358955" cy="523220"/>
-          </a:xfrm>
-          <a:prstGeom prst="rect">
-            <a:avLst/>
-          </a:prstGeom>
-          <a:noFill/>
-        </p:spPr>
-        <p:txBody>
-          <a:bodyPr wrap="square" lIns="91440" tIns="45720" rIns="91440" bIns="45720">
-            <a:spAutoFit/>
-          </a:bodyPr>
-          <a:lstStyle/>
-          <a:p>
-            <a:r>
-              <a:rPr lang="de-DE" sz="2800" dirty="0">
-                <a:ln w="0"/>
-                <a:effectLst>
-                  <a:outerShdw blurRad="38100" dist="19050" dir="2700000" algn="tl" rotWithShape="0">
-                    <a:schemeClr val="dk1">
-                      <a:alpha val="40000"/>
-                    </a:schemeClr>
-                  </a:outerShdw>
-                </a:effectLst>
-              </a:rPr>
-              <a:t>Name</a:t>
-            </a:r>
-            <a:endParaRPr lang="de-DE" sz="2800" b="0" cap="none" spc="0" dirty="0">
-              <a:ln w="0"/>
-              <a:solidFill>
-                <a:schemeClr val="tx1"/>
-              </a:solidFill>
-              <a:effectLst>
-                <a:outerShdw blurRad="38100" dist="19050" dir="2700000" algn="tl" rotWithShape="0">
-                  <a:schemeClr val="dk1">
-                    <a:alpha val="40000"/>
-                  </a:schemeClr>
-                </a:outerShdw>
-              </a:effectLst>
-            </a:endParaRPr>
-          </a:p>
-        </p:txBody>
-      </p:sp>
-      <p:sp>
-        <p:nvSpPr>
           <p:cNvPr id="44" name="Rechteck 43"/>
           <p:cNvSpPr/>
           <p:nvPr/>
         </p:nvSpPr>
         <p:spPr>
           <a:xfrm>
-            <a:off x="5777949" y="5978663"/>
+            <a:off x="5777951" y="4984850"/>
             <a:ext cx="1338468" cy="371061"/>
           </a:xfrm>
           <a:prstGeom prst="rect">
@@ -21923,7 +22839,7 @@
         </p:nvSpPr>
         <p:spPr>
           <a:xfrm>
-            <a:off x="3061252" y="5978664"/>
+            <a:off x="3061254" y="4984851"/>
             <a:ext cx="1470992" cy="371061"/>
           </a:xfrm>
           <a:prstGeom prst="rect">
@@ -22163,6 +23079,516 @@
             <a:r>
               <a:rPr lang="de-DE" dirty="0"/>
               <a:t>Menü</a:t>
+            </a:r>
+          </a:p>
+        </p:txBody>
+      </p:sp>
+      <p:cxnSp>
+        <p:nvCxnSpPr>
+          <p:cNvPr id="3" name="Gerade Verbindung mit Pfeil 2"/>
+          <p:cNvCxnSpPr>
+            <a:cxnSpLocks/>
+          </p:cNvCxnSpPr>
+          <p:nvPr/>
+        </p:nvCxnSpPr>
+        <p:spPr>
+          <a:xfrm flipH="1" flipV="1">
+            <a:off x="6758610" y="2504661"/>
+            <a:ext cx="649355" cy="4572"/>
+          </a:xfrm>
+          <a:prstGeom prst="straightConnector1">
+            <a:avLst/>
+          </a:prstGeom>
+          <a:ln>
+            <a:tailEnd type="triangle"/>
+          </a:ln>
+        </p:spPr>
+        <p:style>
+          <a:lnRef idx="3">
+            <a:schemeClr val="accent2"/>
+          </a:lnRef>
+          <a:fillRef idx="0">
+            <a:schemeClr val="accent2"/>
+          </a:fillRef>
+          <a:effectRef idx="2">
+            <a:schemeClr val="accent2"/>
+          </a:effectRef>
+          <a:fontRef idx="minor">
+            <a:schemeClr val="tx1"/>
+          </a:fontRef>
+        </p:style>
+      </p:cxnSp>
+      <p:sp>
+        <p:nvSpPr>
+          <p:cNvPr id="7" name="Rechteck 6"/>
+          <p:cNvSpPr/>
+          <p:nvPr/>
+        </p:nvSpPr>
+        <p:spPr>
+          <a:xfrm>
+            <a:off x="7407965" y="2234709"/>
+            <a:ext cx="3098092" cy="523220"/>
+          </a:xfrm>
+          <a:prstGeom prst="rect">
+            <a:avLst/>
+          </a:prstGeom>
+          <a:noFill/>
+        </p:spPr>
+        <p:txBody>
+          <a:bodyPr wrap="none" lIns="91440" tIns="45720" rIns="91440" bIns="45720">
+            <a:spAutoFit/>
+          </a:bodyPr>
+          <a:lstStyle/>
+          <a:p>
+            <a:r>
+              <a:rPr lang="de-DE" sz="1400" b="0" cap="none" spc="0" dirty="0">
+                <a:ln w="0"/>
+                <a:solidFill>
+                  <a:schemeClr val="tx1"/>
+                </a:solidFill>
+                <a:effectLst>
+                  <a:outerShdw blurRad="38100" dist="19050" dir="2700000" algn="tl" rotWithShape="0">
+                    <a:schemeClr val="dk1">
+                      <a:alpha val="40000"/>
+                    </a:schemeClr>
+                  </a:outerShdw>
+                </a:effectLst>
+              </a:rPr>
+              <a:t>Hier muss der User den Benutzernamen</a:t>
+            </a:r>
+          </a:p>
+          <a:p>
+            <a:r>
+              <a:rPr lang="de-DE" sz="1400" b="0" cap="none" spc="0" dirty="0">
+                <a:ln w="0"/>
+                <a:solidFill>
+                  <a:schemeClr val="tx1"/>
+                </a:solidFill>
+                <a:effectLst>
+                  <a:outerShdw blurRad="38100" dist="19050" dir="2700000" algn="tl" rotWithShape="0">
+                    <a:schemeClr val="dk1">
+                      <a:alpha val="40000"/>
+                    </a:schemeClr>
+                  </a:outerShdw>
+                </a:effectLst>
+              </a:rPr>
+              <a:t>des neuen Users eintragen</a:t>
+            </a:r>
+          </a:p>
+        </p:txBody>
+      </p:sp>
+      <p:cxnSp>
+        <p:nvCxnSpPr>
+          <p:cNvPr id="32" name="Gerade Verbindung mit Pfeil 31"/>
+          <p:cNvCxnSpPr>
+            <a:cxnSpLocks/>
+          </p:cNvCxnSpPr>
+          <p:nvPr/>
+        </p:nvCxnSpPr>
+        <p:spPr>
+          <a:xfrm flipH="1" flipV="1">
+            <a:off x="6797326" y="3488978"/>
+            <a:ext cx="649355" cy="4572"/>
+          </a:xfrm>
+          <a:prstGeom prst="straightConnector1">
+            <a:avLst/>
+          </a:prstGeom>
+          <a:ln>
+            <a:tailEnd type="triangle"/>
+          </a:ln>
+        </p:spPr>
+        <p:style>
+          <a:lnRef idx="3">
+            <a:schemeClr val="accent2"/>
+          </a:lnRef>
+          <a:fillRef idx="0">
+            <a:schemeClr val="accent2"/>
+          </a:fillRef>
+          <a:effectRef idx="2">
+            <a:schemeClr val="accent2"/>
+          </a:effectRef>
+          <a:fontRef idx="minor">
+            <a:schemeClr val="tx1"/>
+          </a:fontRef>
+        </p:style>
+      </p:cxnSp>
+      <p:sp>
+        <p:nvSpPr>
+          <p:cNvPr id="34" name="Rechteck 33"/>
+          <p:cNvSpPr/>
+          <p:nvPr/>
+        </p:nvSpPr>
+        <p:spPr>
+          <a:xfrm>
+            <a:off x="7446681" y="3233005"/>
+            <a:ext cx="2460161" cy="523220"/>
+          </a:xfrm>
+          <a:prstGeom prst="rect">
+            <a:avLst/>
+          </a:prstGeom>
+          <a:noFill/>
+        </p:spPr>
+        <p:txBody>
+          <a:bodyPr wrap="none" lIns="91440" tIns="45720" rIns="91440" bIns="45720">
+            <a:spAutoFit/>
+          </a:bodyPr>
+          <a:lstStyle/>
+          <a:p>
+            <a:r>
+              <a:rPr lang="de-DE" sz="1400" b="0" cap="none" spc="0" dirty="0">
+                <a:ln w="0"/>
+                <a:solidFill>
+                  <a:schemeClr val="tx1"/>
+                </a:solidFill>
+                <a:effectLst>
+                  <a:outerShdw blurRad="38100" dist="19050" dir="2700000" algn="tl" rotWithShape="0">
+                    <a:schemeClr val="dk1">
+                      <a:alpha val="40000"/>
+                    </a:schemeClr>
+                  </a:outerShdw>
+                </a:effectLst>
+              </a:rPr>
+              <a:t>Hier muss der User die Adresse</a:t>
+            </a:r>
+          </a:p>
+          <a:p>
+            <a:r>
+              <a:rPr lang="de-DE" sz="1400" b="0" cap="none" spc="0" dirty="0">
+                <a:ln w="0"/>
+                <a:solidFill>
+                  <a:schemeClr val="tx1"/>
+                </a:solidFill>
+                <a:effectLst>
+                  <a:outerShdw blurRad="38100" dist="19050" dir="2700000" algn="tl" rotWithShape="0">
+                    <a:schemeClr val="dk1">
+                      <a:alpha val="40000"/>
+                    </a:schemeClr>
+                  </a:outerShdw>
+                </a:effectLst>
+              </a:rPr>
+              <a:t>des neuen Users eintragen</a:t>
+            </a:r>
+          </a:p>
+        </p:txBody>
+      </p:sp>
+      <p:cxnSp>
+        <p:nvCxnSpPr>
+          <p:cNvPr id="35" name="Gerade Verbindung mit Pfeil 34"/>
+          <p:cNvCxnSpPr>
+            <a:cxnSpLocks/>
+          </p:cNvCxnSpPr>
+          <p:nvPr/>
+        </p:nvCxnSpPr>
+        <p:spPr>
+          <a:xfrm flipH="1" flipV="1">
+            <a:off x="6797326" y="4459721"/>
+            <a:ext cx="649355" cy="4572"/>
+          </a:xfrm>
+          <a:prstGeom prst="straightConnector1">
+            <a:avLst/>
+          </a:prstGeom>
+          <a:ln>
+            <a:tailEnd type="triangle"/>
+          </a:ln>
+        </p:spPr>
+        <p:style>
+          <a:lnRef idx="3">
+            <a:schemeClr val="accent2"/>
+          </a:lnRef>
+          <a:fillRef idx="0">
+            <a:schemeClr val="accent2"/>
+          </a:fillRef>
+          <a:effectRef idx="2">
+            <a:schemeClr val="accent2"/>
+          </a:effectRef>
+          <a:fontRef idx="minor">
+            <a:schemeClr val="tx1"/>
+          </a:fontRef>
+        </p:style>
+      </p:cxnSp>
+      <p:sp>
+        <p:nvSpPr>
+          <p:cNvPr id="48" name="Rechteck 47"/>
+          <p:cNvSpPr/>
+          <p:nvPr/>
+        </p:nvSpPr>
+        <p:spPr>
+          <a:xfrm>
+            <a:off x="7446681" y="4194993"/>
+            <a:ext cx="2462534" cy="523220"/>
+          </a:xfrm>
+          <a:prstGeom prst="rect">
+            <a:avLst/>
+          </a:prstGeom>
+          <a:noFill/>
+        </p:spPr>
+        <p:txBody>
+          <a:bodyPr wrap="none" lIns="91440" tIns="45720" rIns="91440" bIns="45720">
+            <a:spAutoFit/>
+          </a:bodyPr>
+          <a:lstStyle/>
+          <a:p>
+            <a:r>
+              <a:rPr lang="de-DE" sz="1400" b="0" cap="none" spc="0" dirty="0">
+                <a:ln w="0"/>
+                <a:solidFill>
+                  <a:schemeClr val="tx1"/>
+                </a:solidFill>
+                <a:effectLst>
+                  <a:outerShdw blurRad="38100" dist="38100" dir="2700000" algn="tl">
+                    <a:srgbClr val="000000">
+                      <a:alpha val="43137"/>
+                    </a:srgbClr>
+                  </a:outerShdw>
+                </a:effectLst>
+              </a:rPr>
+              <a:t>Hier muss der User den Namen</a:t>
+            </a:r>
+          </a:p>
+          <a:p>
+            <a:r>
+              <a:rPr lang="de-DE" sz="1400" b="0" cap="none" spc="0" dirty="0">
+                <a:ln w="0"/>
+                <a:solidFill>
+                  <a:schemeClr val="tx1"/>
+                </a:solidFill>
+                <a:effectLst>
+                  <a:outerShdw blurRad="38100" dist="38100" dir="2700000" algn="tl">
+                    <a:srgbClr val="000000">
+                      <a:alpha val="43137"/>
+                    </a:srgbClr>
+                  </a:outerShdw>
+                </a:effectLst>
+              </a:rPr>
+              <a:t>des neuen Users eintragen</a:t>
+            </a:r>
+          </a:p>
+        </p:txBody>
+      </p:sp>
+      <p:sp>
+        <p:nvSpPr>
+          <p:cNvPr id="49" name="Rechteck 48"/>
+          <p:cNvSpPr/>
+          <p:nvPr/>
+        </p:nvSpPr>
+        <p:spPr>
+          <a:xfrm>
+            <a:off x="6838122" y="1622055"/>
+            <a:ext cx="4366516" cy="307777"/>
+          </a:xfrm>
+          <a:prstGeom prst="rect">
+            <a:avLst/>
+          </a:prstGeom>
+          <a:noFill/>
+        </p:spPr>
+        <p:txBody>
+          <a:bodyPr wrap="none" lIns="91440" tIns="45720" rIns="91440" bIns="45720">
+            <a:spAutoFit/>
+          </a:bodyPr>
+          <a:lstStyle/>
+          <a:p>
+            <a:r>
+              <a:rPr lang="de-DE" sz="1400" b="0" cap="none" spc="0" dirty="0">
+                <a:ln w="0"/>
+                <a:solidFill>
+                  <a:schemeClr val="tx1"/>
+                </a:solidFill>
+                <a:effectLst>
+                  <a:outerShdw blurRad="38100" dist="38100" dir="2700000" algn="tl">
+                    <a:srgbClr val="000000">
+                      <a:alpha val="43137"/>
+                    </a:srgbClr>
+                  </a:outerShdw>
+                </a:effectLst>
+              </a:rPr>
+              <a:t>Dies ist nur ein Beispiel an Informationen, weitere folgen.</a:t>
+            </a:r>
+          </a:p>
+        </p:txBody>
+      </p:sp>
+      <p:cxnSp>
+        <p:nvCxnSpPr>
+          <p:cNvPr id="11" name="Gerade Verbindung mit Pfeil 10"/>
+          <p:cNvCxnSpPr>
+            <a:stCxn id="49" idx="1"/>
+          </p:cNvCxnSpPr>
+          <p:nvPr/>
+        </p:nvCxnSpPr>
+        <p:spPr>
+          <a:xfrm flipH="1">
+            <a:off x="6228522" y="1775944"/>
+            <a:ext cx="609600" cy="384160"/>
+          </a:xfrm>
+          <a:prstGeom prst="straightConnector1">
+            <a:avLst/>
+          </a:prstGeom>
+          <a:ln>
+            <a:tailEnd type="triangle"/>
+          </a:ln>
+        </p:spPr>
+        <p:style>
+          <a:lnRef idx="3">
+            <a:schemeClr val="accent2"/>
+          </a:lnRef>
+          <a:fillRef idx="0">
+            <a:schemeClr val="accent2"/>
+          </a:fillRef>
+          <a:effectRef idx="2">
+            <a:schemeClr val="accent2"/>
+          </a:effectRef>
+          <a:fontRef idx="minor">
+            <a:schemeClr val="tx1"/>
+          </a:fontRef>
+        </p:style>
+      </p:cxnSp>
+      <p:cxnSp>
+        <p:nvCxnSpPr>
+          <p:cNvPr id="50" name="Gerade Verbindung mit Pfeil 49"/>
+          <p:cNvCxnSpPr>
+            <a:cxnSpLocks/>
+          </p:cNvCxnSpPr>
+          <p:nvPr/>
+        </p:nvCxnSpPr>
+        <p:spPr>
+          <a:xfrm flipH="1" flipV="1">
+            <a:off x="6970643" y="5277646"/>
+            <a:ext cx="795130" cy="378133"/>
+          </a:xfrm>
+          <a:prstGeom prst="straightConnector1">
+            <a:avLst/>
+          </a:prstGeom>
+          <a:ln>
+            <a:tailEnd type="triangle"/>
+          </a:ln>
+        </p:spPr>
+        <p:style>
+          <a:lnRef idx="3">
+            <a:schemeClr val="accent2"/>
+          </a:lnRef>
+          <a:fillRef idx="0">
+            <a:schemeClr val="accent2"/>
+          </a:fillRef>
+          <a:effectRef idx="2">
+            <a:schemeClr val="accent2"/>
+          </a:effectRef>
+          <a:fontRef idx="minor">
+            <a:schemeClr val="tx1"/>
+          </a:fontRef>
+        </p:style>
+      </p:cxnSp>
+      <p:sp>
+        <p:nvSpPr>
+          <p:cNvPr id="51" name="Rechteck 50"/>
+          <p:cNvSpPr/>
+          <p:nvPr/>
+        </p:nvSpPr>
+        <p:spPr>
+          <a:xfrm>
+            <a:off x="7765772" y="5488976"/>
+            <a:ext cx="2462534" cy="738664"/>
+          </a:xfrm>
+          <a:prstGeom prst="rect">
+            <a:avLst/>
+          </a:prstGeom>
+          <a:noFill/>
+        </p:spPr>
+        <p:txBody>
+          <a:bodyPr wrap="square" lIns="91440" tIns="45720" rIns="91440" bIns="45720">
+            <a:spAutoFit/>
+          </a:bodyPr>
+          <a:lstStyle/>
+          <a:p>
+            <a:r>
+              <a:rPr lang="de-DE" sz="1400" b="0" cap="none" spc="0" dirty="0">
+                <a:ln w="0"/>
+                <a:solidFill>
+                  <a:schemeClr val="tx1"/>
+                </a:solidFill>
+                <a:effectLst>
+                  <a:outerShdw blurRad="38100" dist="38100" dir="2700000" algn="tl">
+                    <a:srgbClr val="000000">
+                      <a:alpha val="43137"/>
+                    </a:srgbClr>
+                  </a:outerShdw>
+                </a:effectLst>
+              </a:rPr>
+              <a:t>Beim Klick auf diesen Button wird der neue User in der Datenbank angelegt</a:t>
+            </a:r>
+          </a:p>
+        </p:txBody>
+      </p:sp>
+      <p:cxnSp>
+        <p:nvCxnSpPr>
+          <p:cNvPr id="52" name="Gerade Verbindung mit Pfeil 51"/>
+          <p:cNvCxnSpPr>
+            <a:cxnSpLocks/>
+          </p:cNvCxnSpPr>
+          <p:nvPr/>
+        </p:nvCxnSpPr>
+        <p:spPr>
+          <a:xfrm flipV="1">
+            <a:off x="3901465" y="5275077"/>
+            <a:ext cx="420523" cy="453897"/>
+          </a:xfrm>
+          <a:prstGeom prst="straightConnector1">
+            <a:avLst/>
+          </a:prstGeom>
+          <a:ln>
+            <a:tailEnd type="triangle"/>
+          </a:ln>
+        </p:spPr>
+        <p:style>
+          <a:lnRef idx="3">
+            <a:schemeClr val="accent2"/>
+          </a:lnRef>
+          <a:fillRef idx="0">
+            <a:schemeClr val="accent2"/>
+          </a:fillRef>
+          <a:effectRef idx="2">
+            <a:schemeClr val="accent2"/>
+          </a:effectRef>
+          <a:fontRef idx="minor">
+            <a:schemeClr val="tx1"/>
+          </a:fontRef>
+        </p:style>
+      </p:cxnSp>
+      <p:sp>
+        <p:nvSpPr>
+          <p:cNvPr id="53" name="Rechteck 52"/>
+          <p:cNvSpPr/>
+          <p:nvPr/>
+        </p:nvSpPr>
+        <p:spPr>
+          <a:xfrm>
+            <a:off x="1764909" y="5646256"/>
+            <a:ext cx="2462534" cy="738664"/>
+          </a:xfrm>
+          <a:prstGeom prst="rect">
+            <a:avLst/>
+          </a:prstGeom>
+          <a:noFill/>
+        </p:spPr>
+        <p:txBody>
+          <a:bodyPr wrap="square" lIns="91440" tIns="45720" rIns="91440" bIns="45720">
+            <a:spAutoFit/>
+          </a:bodyPr>
+          <a:lstStyle/>
+          <a:p>
+            <a:r>
+              <a:rPr lang="de-DE" sz="1400" b="0" cap="none" spc="0" dirty="0">
+                <a:ln w="0"/>
+                <a:solidFill>
+                  <a:schemeClr val="tx1"/>
+                </a:solidFill>
+                <a:effectLst>
+                  <a:outerShdw blurRad="38100" dist="38100" dir="2700000" algn="tl">
+                    <a:srgbClr val="000000">
+                      <a:alpha val="43137"/>
+                    </a:srgbClr>
+                  </a:outerShdw>
+                </a:effectLst>
+              </a:rPr>
+              <a:t>Beim Klick auf diesen Button werden die eingetragenen Informationen gelöscht</a:t>
             </a:r>
           </a:p>
         </p:txBody>
@@ -27119,6 +28545,537 @@
           </a:p>
         </p:txBody>
       </p:sp>
+      <p:cxnSp>
+        <p:nvCxnSpPr>
+          <p:cNvPr id="34" name="Gerade Verbindung mit Pfeil 33"/>
+          <p:cNvCxnSpPr>
+            <a:cxnSpLocks/>
+            <a:endCxn id="45" idx="1"/>
+          </p:cNvCxnSpPr>
+          <p:nvPr/>
+        </p:nvCxnSpPr>
+        <p:spPr>
+          <a:xfrm>
+            <a:off x="2501177" y="5884816"/>
+            <a:ext cx="560075" cy="279379"/>
+          </a:xfrm>
+          <a:prstGeom prst="straightConnector1">
+            <a:avLst/>
+          </a:prstGeom>
+          <a:ln>
+            <a:tailEnd type="triangle"/>
+          </a:ln>
+        </p:spPr>
+        <p:style>
+          <a:lnRef idx="3">
+            <a:schemeClr val="accent2"/>
+          </a:lnRef>
+          <a:fillRef idx="0">
+            <a:schemeClr val="accent2"/>
+          </a:fillRef>
+          <a:effectRef idx="2">
+            <a:schemeClr val="accent2"/>
+          </a:effectRef>
+          <a:fontRef idx="minor">
+            <a:schemeClr val="tx1"/>
+          </a:fontRef>
+        </p:style>
+      </p:cxnSp>
+      <p:sp>
+        <p:nvSpPr>
+          <p:cNvPr id="35" name="Rechteck 34"/>
+          <p:cNvSpPr/>
+          <p:nvPr/>
+        </p:nvSpPr>
+        <p:spPr>
+          <a:xfrm>
+            <a:off x="383131" y="5448126"/>
+            <a:ext cx="2462534" cy="738664"/>
+          </a:xfrm>
+          <a:prstGeom prst="rect">
+            <a:avLst/>
+          </a:prstGeom>
+          <a:noFill/>
+        </p:spPr>
+        <p:txBody>
+          <a:bodyPr wrap="square" lIns="91440" tIns="45720" rIns="91440" bIns="45720">
+            <a:spAutoFit/>
+          </a:bodyPr>
+          <a:lstStyle/>
+          <a:p>
+            <a:r>
+              <a:rPr lang="de-DE" sz="1400" b="0" cap="none" spc="0" dirty="0">
+                <a:ln w="0"/>
+                <a:solidFill>
+                  <a:schemeClr val="tx1"/>
+                </a:solidFill>
+                <a:effectLst>
+                  <a:outerShdw blurRad="38100" dist="38100" dir="2700000" algn="tl">
+                    <a:srgbClr val="000000">
+                      <a:alpha val="43137"/>
+                    </a:srgbClr>
+                  </a:outerShdw>
+                </a:effectLst>
+              </a:rPr>
+              <a:t>Beim Klick auf diesen Button werden die eingetragenen Informationen gelöscht</a:t>
+            </a:r>
+          </a:p>
+        </p:txBody>
+      </p:sp>
+      <p:cxnSp>
+        <p:nvCxnSpPr>
+          <p:cNvPr id="48" name="Gerade Verbindung mit Pfeil 47"/>
+          <p:cNvCxnSpPr>
+            <a:cxnSpLocks/>
+          </p:cNvCxnSpPr>
+          <p:nvPr/>
+        </p:nvCxnSpPr>
+        <p:spPr>
+          <a:xfrm flipH="1">
+            <a:off x="6990522" y="5880756"/>
+            <a:ext cx="775252" cy="306034"/>
+          </a:xfrm>
+          <a:prstGeom prst="straightConnector1">
+            <a:avLst/>
+          </a:prstGeom>
+          <a:ln>
+            <a:tailEnd type="triangle"/>
+          </a:ln>
+        </p:spPr>
+        <p:style>
+          <a:lnRef idx="3">
+            <a:schemeClr val="accent2"/>
+          </a:lnRef>
+          <a:fillRef idx="0">
+            <a:schemeClr val="accent2"/>
+          </a:fillRef>
+          <a:effectRef idx="2">
+            <a:schemeClr val="accent2"/>
+          </a:effectRef>
+          <a:fontRef idx="minor">
+            <a:schemeClr val="tx1"/>
+          </a:fontRef>
+        </p:style>
+      </p:cxnSp>
+      <p:sp>
+        <p:nvSpPr>
+          <p:cNvPr id="49" name="Rechteck 48"/>
+          <p:cNvSpPr/>
+          <p:nvPr/>
+        </p:nvSpPr>
+        <p:spPr>
+          <a:xfrm>
+            <a:off x="7765772" y="5713952"/>
+            <a:ext cx="2462534" cy="738664"/>
+          </a:xfrm>
+          <a:prstGeom prst="rect">
+            <a:avLst/>
+          </a:prstGeom>
+          <a:noFill/>
+        </p:spPr>
+        <p:txBody>
+          <a:bodyPr wrap="square" lIns="91440" tIns="45720" rIns="91440" bIns="45720">
+            <a:spAutoFit/>
+          </a:bodyPr>
+          <a:lstStyle/>
+          <a:p>
+            <a:r>
+              <a:rPr lang="de-DE" sz="1400" b="0" cap="none" spc="0" dirty="0">
+                <a:ln w="0"/>
+                <a:solidFill>
+                  <a:schemeClr val="tx1"/>
+                </a:solidFill>
+                <a:effectLst>
+                  <a:outerShdw blurRad="38100" dist="38100" dir="2700000" algn="tl">
+                    <a:srgbClr val="000000">
+                      <a:alpha val="43137"/>
+                    </a:srgbClr>
+                  </a:outerShdw>
+                </a:effectLst>
+              </a:rPr>
+              <a:t>Beim Klick auf diesen Button wird das neue Gerät in der Datenbank angelegt</a:t>
+            </a:r>
+          </a:p>
+        </p:txBody>
+      </p:sp>
+      <p:cxnSp>
+        <p:nvCxnSpPr>
+          <p:cNvPr id="50" name="Gerade Verbindung mit Pfeil 49"/>
+          <p:cNvCxnSpPr>
+            <a:cxnSpLocks/>
+          </p:cNvCxnSpPr>
+          <p:nvPr/>
+        </p:nvCxnSpPr>
+        <p:spPr>
+          <a:xfrm flipH="1" flipV="1">
+            <a:off x="6758610" y="2504661"/>
+            <a:ext cx="649355" cy="4572"/>
+          </a:xfrm>
+          <a:prstGeom prst="straightConnector1">
+            <a:avLst/>
+          </a:prstGeom>
+          <a:ln>
+            <a:tailEnd type="triangle"/>
+          </a:ln>
+        </p:spPr>
+        <p:style>
+          <a:lnRef idx="3">
+            <a:schemeClr val="accent2"/>
+          </a:lnRef>
+          <a:fillRef idx="0">
+            <a:schemeClr val="accent2"/>
+          </a:fillRef>
+          <a:effectRef idx="2">
+            <a:schemeClr val="accent2"/>
+          </a:effectRef>
+          <a:fontRef idx="minor">
+            <a:schemeClr val="tx1"/>
+          </a:fontRef>
+        </p:style>
+      </p:cxnSp>
+      <p:sp>
+        <p:nvSpPr>
+          <p:cNvPr id="51" name="Rechteck 50"/>
+          <p:cNvSpPr/>
+          <p:nvPr/>
+        </p:nvSpPr>
+        <p:spPr>
+          <a:xfrm>
+            <a:off x="7407965" y="2233889"/>
+            <a:ext cx="3295902" cy="523220"/>
+          </a:xfrm>
+          <a:prstGeom prst="rect">
+            <a:avLst/>
+          </a:prstGeom>
+          <a:noFill/>
+        </p:spPr>
+        <p:txBody>
+          <a:bodyPr wrap="none" lIns="91440" tIns="45720" rIns="91440" bIns="45720">
+            <a:spAutoFit/>
+          </a:bodyPr>
+          <a:lstStyle/>
+          <a:p>
+            <a:r>
+              <a:rPr lang="de-DE" sz="1400" b="0" cap="none" spc="0" dirty="0">
+                <a:ln w="0"/>
+                <a:solidFill>
+                  <a:schemeClr val="tx1"/>
+                </a:solidFill>
+                <a:effectLst>
+                  <a:outerShdw blurRad="38100" dist="19050" dir="2700000" algn="tl" rotWithShape="0">
+                    <a:schemeClr val="dk1">
+                      <a:alpha val="40000"/>
+                    </a:schemeClr>
+                  </a:outerShdw>
+                </a:effectLst>
+              </a:rPr>
+              <a:t>Hier muss der User die Gerätebezeichnung</a:t>
+            </a:r>
+          </a:p>
+          <a:p>
+            <a:r>
+              <a:rPr lang="de-DE" sz="1400" b="0" cap="none" spc="0" dirty="0">
+                <a:ln w="0"/>
+                <a:solidFill>
+                  <a:schemeClr val="tx1"/>
+                </a:solidFill>
+                <a:effectLst>
+                  <a:outerShdw blurRad="38100" dist="19050" dir="2700000" algn="tl" rotWithShape="0">
+                    <a:schemeClr val="dk1">
+                      <a:alpha val="40000"/>
+                    </a:schemeClr>
+                  </a:outerShdw>
+                </a:effectLst>
+              </a:rPr>
+              <a:t>des neuen Gerätes eintragen</a:t>
+            </a:r>
+          </a:p>
+        </p:txBody>
+      </p:sp>
+      <p:sp>
+        <p:nvSpPr>
+          <p:cNvPr id="52" name="Rechteck 51"/>
+          <p:cNvSpPr/>
+          <p:nvPr/>
+        </p:nvSpPr>
+        <p:spPr>
+          <a:xfrm>
+            <a:off x="6838122" y="1622055"/>
+            <a:ext cx="4366516" cy="307777"/>
+          </a:xfrm>
+          <a:prstGeom prst="rect">
+            <a:avLst/>
+          </a:prstGeom>
+          <a:noFill/>
+        </p:spPr>
+        <p:txBody>
+          <a:bodyPr wrap="none" lIns="91440" tIns="45720" rIns="91440" bIns="45720">
+            <a:spAutoFit/>
+          </a:bodyPr>
+          <a:lstStyle/>
+          <a:p>
+            <a:r>
+              <a:rPr lang="de-DE" sz="1400" b="0" cap="none" spc="0" dirty="0">
+                <a:ln w="0"/>
+                <a:solidFill>
+                  <a:schemeClr val="tx1"/>
+                </a:solidFill>
+                <a:effectLst>
+                  <a:outerShdw blurRad="38100" dist="38100" dir="2700000" algn="tl">
+                    <a:srgbClr val="000000">
+                      <a:alpha val="43137"/>
+                    </a:srgbClr>
+                  </a:outerShdw>
+                </a:effectLst>
+              </a:rPr>
+              <a:t>Dies ist nur ein Beispiel an Informationen, weitere folgen.</a:t>
+            </a:r>
+          </a:p>
+        </p:txBody>
+      </p:sp>
+      <p:cxnSp>
+        <p:nvCxnSpPr>
+          <p:cNvPr id="53" name="Gerade Verbindung mit Pfeil 52"/>
+          <p:cNvCxnSpPr>
+            <a:stCxn id="52" idx="1"/>
+          </p:cNvCxnSpPr>
+          <p:nvPr/>
+        </p:nvCxnSpPr>
+        <p:spPr>
+          <a:xfrm flipH="1">
+            <a:off x="6228522" y="1775944"/>
+            <a:ext cx="609600" cy="384160"/>
+          </a:xfrm>
+          <a:prstGeom prst="straightConnector1">
+            <a:avLst/>
+          </a:prstGeom>
+          <a:ln>
+            <a:tailEnd type="triangle"/>
+          </a:ln>
+        </p:spPr>
+        <p:style>
+          <a:lnRef idx="3">
+            <a:schemeClr val="accent2"/>
+          </a:lnRef>
+          <a:fillRef idx="0">
+            <a:schemeClr val="accent2"/>
+          </a:fillRef>
+          <a:effectRef idx="2">
+            <a:schemeClr val="accent2"/>
+          </a:effectRef>
+          <a:fontRef idx="minor">
+            <a:schemeClr val="tx1"/>
+          </a:fontRef>
+        </p:style>
+      </p:cxnSp>
+      <p:cxnSp>
+        <p:nvCxnSpPr>
+          <p:cNvPr id="54" name="Gerade Verbindung mit Pfeil 53"/>
+          <p:cNvCxnSpPr>
+            <a:cxnSpLocks/>
+          </p:cNvCxnSpPr>
+          <p:nvPr/>
+        </p:nvCxnSpPr>
+        <p:spPr>
+          <a:xfrm flipH="1" flipV="1">
+            <a:off x="6990522" y="3477016"/>
+            <a:ext cx="649355" cy="4572"/>
+          </a:xfrm>
+          <a:prstGeom prst="straightConnector1">
+            <a:avLst/>
+          </a:prstGeom>
+          <a:ln>
+            <a:tailEnd type="triangle"/>
+          </a:ln>
+        </p:spPr>
+        <p:style>
+          <a:lnRef idx="3">
+            <a:schemeClr val="accent2"/>
+          </a:lnRef>
+          <a:fillRef idx="0">
+            <a:schemeClr val="accent2"/>
+          </a:fillRef>
+          <a:effectRef idx="2">
+            <a:schemeClr val="accent2"/>
+          </a:effectRef>
+          <a:fontRef idx="minor">
+            <a:schemeClr val="tx1"/>
+          </a:fontRef>
+        </p:style>
+      </p:cxnSp>
+      <p:sp>
+        <p:nvSpPr>
+          <p:cNvPr id="55" name="Rechteck 54"/>
+          <p:cNvSpPr/>
+          <p:nvPr/>
+        </p:nvSpPr>
+        <p:spPr>
+          <a:xfrm>
+            <a:off x="7639877" y="3206244"/>
+            <a:ext cx="3447995" cy="523220"/>
+          </a:xfrm>
+          <a:prstGeom prst="rect">
+            <a:avLst/>
+          </a:prstGeom>
+          <a:noFill/>
+        </p:spPr>
+        <p:txBody>
+          <a:bodyPr wrap="none" lIns="91440" tIns="45720" rIns="91440" bIns="45720">
+            <a:spAutoFit/>
+          </a:bodyPr>
+          <a:lstStyle/>
+          <a:p>
+            <a:r>
+              <a:rPr lang="de-DE" sz="1400" b="0" cap="none" spc="0" dirty="0">
+                <a:ln w="0"/>
+                <a:solidFill>
+                  <a:schemeClr val="tx1"/>
+                </a:solidFill>
+                <a:effectLst>
+                  <a:outerShdw blurRad="38100" dist="19050" dir="2700000" algn="tl" rotWithShape="0">
+                    <a:schemeClr val="dk1">
+                      <a:alpha val="40000"/>
+                    </a:schemeClr>
+                  </a:outerShdw>
+                </a:effectLst>
+              </a:rPr>
+              <a:t>Ein Dropdownmenü -&gt; User muss passenden</a:t>
+            </a:r>
+          </a:p>
+          <a:p>
+            <a:r>
+              <a:rPr lang="de-DE" sz="1400" dirty="0">
+                <a:ln w="0"/>
+                <a:effectLst>
+                  <a:outerShdw blurRad="38100" dist="19050" dir="2700000" algn="tl" rotWithShape="0">
+                    <a:schemeClr val="dk1">
+                      <a:alpha val="40000"/>
+                    </a:schemeClr>
+                  </a:outerShdw>
+                </a:effectLst>
+              </a:rPr>
+              <a:t>Hersteller auswählen</a:t>
+            </a:r>
+            <a:endParaRPr lang="de-DE" sz="1400" b="0" cap="none" spc="0" dirty="0">
+              <a:ln w="0"/>
+              <a:solidFill>
+                <a:schemeClr val="tx1"/>
+              </a:solidFill>
+              <a:effectLst>
+                <a:outerShdw blurRad="38100" dist="19050" dir="2700000" algn="tl" rotWithShape="0">
+                  <a:schemeClr val="dk1">
+                    <a:alpha val="40000"/>
+                  </a:schemeClr>
+                </a:outerShdw>
+              </a:effectLst>
+            </a:endParaRPr>
+          </a:p>
+        </p:txBody>
+      </p:sp>
+      <p:cxnSp>
+        <p:nvCxnSpPr>
+          <p:cNvPr id="56" name="Gerade Verbindung mit Pfeil 55"/>
+          <p:cNvCxnSpPr>
+            <a:cxnSpLocks/>
+          </p:cNvCxnSpPr>
+          <p:nvPr/>
+        </p:nvCxnSpPr>
+        <p:spPr>
+          <a:xfrm flipH="1" flipV="1">
+            <a:off x="6990522" y="4477075"/>
+            <a:ext cx="649355" cy="4572"/>
+          </a:xfrm>
+          <a:prstGeom prst="straightConnector1">
+            <a:avLst/>
+          </a:prstGeom>
+          <a:ln>
+            <a:tailEnd type="triangle"/>
+          </a:ln>
+        </p:spPr>
+        <p:style>
+          <a:lnRef idx="3">
+            <a:schemeClr val="accent2"/>
+          </a:lnRef>
+          <a:fillRef idx="0">
+            <a:schemeClr val="accent2"/>
+          </a:fillRef>
+          <a:effectRef idx="2">
+            <a:schemeClr val="accent2"/>
+          </a:effectRef>
+          <a:fontRef idx="minor">
+            <a:schemeClr val="tx1"/>
+          </a:fontRef>
+        </p:style>
+      </p:cxnSp>
+      <p:sp>
+        <p:nvSpPr>
+          <p:cNvPr id="57" name="Rechteck 56"/>
+          <p:cNvSpPr/>
+          <p:nvPr/>
+        </p:nvSpPr>
+        <p:spPr>
+          <a:xfrm>
+            <a:off x="7639877" y="4206303"/>
+            <a:ext cx="3447995" cy="523220"/>
+          </a:xfrm>
+          <a:prstGeom prst="rect">
+            <a:avLst/>
+          </a:prstGeom>
+          <a:noFill/>
+        </p:spPr>
+        <p:txBody>
+          <a:bodyPr wrap="none" lIns="91440" tIns="45720" rIns="91440" bIns="45720">
+            <a:spAutoFit/>
+          </a:bodyPr>
+          <a:lstStyle/>
+          <a:p>
+            <a:r>
+              <a:rPr lang="de-DE" sz="1400" b="0" cap="none" spc="0" dirty="0">
+                <a:ln w="0"/>
+                <a:solidFill>
+                  <a:schemeClr val="tx1"/>
+                </a:solidFill>
+                <a:effectLst>
+                  <a:outerShdw blurRad="38100" dist="19050" dir="2700000" algn="tl" rotWithShape="0">
+                    <a:schemeClr val="dk1">
+                      <a:alpha val="40000"/>
+                    </a:schemeClr>
+                  </a:outerShdw>
+                </a:effectLst>
+              </a:rPr>
+              <a:t>Ein Dropdownmenü -&gt; User muss passenden</a:t>
+            </a:r>
+          </a:p>
+          <a:p>
+            <a:r>
+              <a:rPr lang="de-DE" sz="1400" dirty="0">
+                <a:ln w="0"/>
+                <a:effectLst>
+                  <a:outerShdw blurRad="38100" dist="19050" dir="2700000" algn="tl" rotWithShape="0">
+                    <a:schemeClr val="dk1">
+                      <a:alpha val="40000"/>
+                    </a:schemeClr>
+                  </a:outerShdw>
+                </a:effectLst>
+              </a:rPr>
+              <a:t>Raum auswählen</a:t>
+            </a:r>
+            <a:endParaRPr lang="de-DE" sz="1400" b="0" cap="none" spc="0" dirty="0">
+              <a:ln w="0"/>
+              <a:solidFill>
+                <a:schemeClr val="tx1"/>
+              </a:solidFill>
+              <a:effectLst>
+                <a:outerShdw blurRad="38100" dist="19050" dir="2700000" algn="tl" rotWithShape="0">
+                  <a:schemeClr val="dk1">
+                    <a:alpha val="40000"/>
+                  </a:schemeClr>
+                </a:outerShdw>
+              </a:effectLst>
+            </a:endParaRPr>
+          </a:p>
+        </p:txBody>
+      </p:sp>
     </p:spTree>
     <p:extLst>
       <p:ext uri="{BB962C8B-B14F-4D97-AF65-F5344CB8AC3E}">

</xml_diff>